<commit_message>
Modifs Diapo PL et modifs schema branchement Stellaris
</commit_message>
<xml_diff>
--- a/reports/presentation/kinocto - PLB.pptx
+++ b/reports/presentation/kinocto - PLB.pptx
@@ -121,6 +121,7 @@
   <p:cmAuthor id="1" name="Simon Grenier" initials="SG" lastIdx="4" clrIdx="1"/>
   <p:cmAuthor id="2" name="Francis Valois" initials="FV" lastIdx="6" clrIdx="2"/>
   <p:cmAuthor id="3" name="Marc-André Lapointe" initials="" lastIdx="2" clrIdx="3"/>
+  <p:cmAuthor id="4" name="BUL-THINK" initials="B" lastIdx="1" clrIdx="4"/>
 </p:cmAuthorLst>
 </file>
 
@@ -207,7 +208,7 @@
             <a:fld id="{381DA2EF-BD8E-7540-8292-FDE805AE340C}" type="datetimeFigureOut">
               <a:rPr lang="en-US" smtClean="0"/>
               <a:pPr/>
-              <a:t>2/24/2013</a:t>
+              <a:t>2/26/2013</a:t>
             </a:fld>
             <a:endParaRPr lang="en-US"/>
           </a:p>
@@ -374,7 +375,7 @@
             <a:fld id="{2D05A41B-3834-2942-A655-D365844A6823}" type="datetimeFigureOut">
               <a:rPr lang="en-US" smtClean="0"/>
               <a:pPr/>
-              <a:t>2/24/2013</a:t>
+              <a:t>2/26/2013</a:t>
             </a:fld>
             <a:endParaRPr lang="en-US"/>
           </a:p>
@@ -863,7 +864,7 @@
             <a:fld id="{1B7D6F30-1720-D44A-AAAC-31BBD1F6EF97}" type="datetimeFigureOut">
               <a:rPr lang="en-US" smtClean="0"/>
               <a:pPr/>
-              <a:t>2/24/2013</a:t>
+              <a:t>2/26/2013</a:t>
             </a:fld>
             <a:endParaRPr lang="en-US"/>
           </a:p>
@@ -1194,7 +1195,7 @@
             <a:fld id="{1B7D6F30-1720-D44A-AAAC-31BBD1F6EF97}" type="datetimeFigureOut">
               <a:rPr lang="en-US" smtClean="0"/>
               <a:pPr/>
-              <a:t>2/24/2013</a:t>
+              <a:t>2/26/2013</a:t>
             </a:fld>
             <a:endParaRPr lang="en-US"/>
           </a:p>
@@ -1481,7 +1482,7 @@
             <a:fld id="{1B7D6F30-1720-D44A-AAAC-31BBD1F6EF97}" type="datetimeFigureOut">
               <a:rPr lang="en-US" smtClean="0"/>
               <a:pPr/>
-              <a:t>2/24/2013</a:t>
+              <a:t>2/26/2013</a:t>
             </a:fld>
             <a:endParaRPr lang="en-US"/>
           </a:p>
@@ -1784,7 +1785,7 @@
             <a:fld id="{1B7D6F30-1720-D44A-AAAC-31BBD1F6EF97}" type="datetimeFigureOut">
               <a:rPr lang="en-US" smtClean="0"/>
               <a:pPr/>
-              <a:t>2/24/2013</a:t>
+              <a:t>2/26/2013</a:t>
             </a:fld>
             <a:endParaRPr lang="en-US"/>
           </a:p>
@@ -2122,7 +2123,7 @@
             <a:fld id="{1B7D6F30-1720-D44A-AAAC-31BBD1F6EF97}" type="datetimeFigureOut">
               <a:rPr lang="en-US" smtClean="0"/>
               <a:pPr/>
-              <a:t>2/24/2013</a:t>
+              <a:t>2/26/2013</a:t>
             </a:fld>
             <a:endParaRPr lang="en-US"/>
           </a:p>
@@ -2382,7 +2383,7 @@
             <a:fld id="{1B7D6F30-1720-D44A-AAAC-31BBD1F6EF97}" type="datetimeFigureOut">
               <a:rPr lang="en-US" smtClean="0"/>
               <a:pPr/>
-              <a:t>2/24/2013</a:t>
+              <a:t>2/26/2013</a:t>
             </a:fld>
             <a:endParaRPr lang="en-US"/>
           </a:p>
@@ -2571,7 +2572,7 @@
             <a:fld id="{1B7D6F30-1720-D44A-AAAC-31BBD1F6EF97}" type="datetimeFigureOut">
               <a:rPr lang="en-US" smtClean="0"/>
               <a:pPr/>
-              <a:t>2/24/2013</a:t>
+              <a:t>2/26/2013</a:t>
             </a:fld>
             <a:endParaRPr lang="en-US"/>
           </a:p>
@@ -2755,7 +2756,7 @@
             <a:fld id="{1B7D6F30-1720-D44A-AAAC-31BBD1F6EF97}" type="datetimeFigureOut">
               <a:rPr lang="en-US" smtClean="0"/>
               <a:pPr/>
-              <a:t>2/24/2013</a:t>
+              <a:t>2/26/2013</a:t>
             </a:fld>
             <a:endParaRPr lang="en-US"/>
           </a:p>
@@ -3034,7 +3035,7 @@
             <a:fld id="{1B7D6F30-1720-D44A-AAAC-31BBD1F6EF97}" type="datetimeFigureOut">
               <a:rPr lang="en-US" smtClean="0"/>
               <a:pPr/>
-              <a:t>2/24/2013</a:t>
+              <a:t>2/26/2013</a:t>
             </a:fld>
             <a:endParaRPr lang="en-US"/>
           </a:p>
@@ -3350,7 +3351,7 @@
             <a:fld id="{1B7D6F30-1720-D44A-AAAC-31BBD1F6EF97}" type="datetimeFigureOut">
               <a:rPr lang="en-US" smtClean="0"/>
               <a:pPr/>
-              <a:t>2/24/2013</a:t>
+              <a:t>2/26/2013</a:t>
             </a:fld>
             <a:endParaRPr lang="en-US"/>
           </a:p>
@@ -3652,7 +3653,7 @@
             <a:fld id="{1B7D6F30-1720-D44A-AAAC-31BBD1F6EF97}" type="datetimeFigureOut">
               <a:rPr lang="en-US" smtClean="0"/>
               <a:pPr/>
-              <a:t>2/24/2013</a:t>
+              <a:t>2/26/2013</a:t>
             </a:fld>
             <a:endParaRPr lang="en-US"/>
           </a:p>
@@ -4092,7 +4093,7 @@
             <a:fld id="{1B7D6F30-1720-D44A-AAAC-31BBD1F6EF97}" type="datetimeFigureOut">
               <a:rPr lang="en-US" smtClean="0"/>
               <a:pPr/>
-              <a:t>2/24/2013</a:t>
+              <a:t>2/26/2013</a:t>
             </a:fld>
             <a:endParaRPr lang="en-US"/>
           </a:p>
@@ -4448,7 +4449,7 @@
             <a:fld id="{1B7D6F30-1720-D44A-AAAC-31BBD1F6EF97}" type="datetimeFigureOut">
               <a:rPr lang="en-US" smtClean="0"/>
               <a:pPr/>
-              <a:t>2/24/2013</a:t>
+              <a:t>2/26/2013</a:t>
             </a:fld>
             <a:endParaRPr lang="en-US"/>
           </a:p>
@@ -4548,7 +4549,7 @@
             <a:fld id="{1B7D6F30-1720-D44A-AAAC-31BBD1F6EF97}" type="datetimeFigureOut">
               <a:rPr lang="en-US" smtClean="0"/>
               <a:pPr/>
-              <a:t>2/24/2013</a:t>
+              <a:t>2/26/2013</a:t>
             </a:fld>
             <a:endParaRPr lang="en-US"/>
           </a:p>
@@ -4895,7 +4896,7 @@
             <a:fld id="{1B7D6F30-1720-D44A-AAAC-31BBD1F6EF97}" type="datetimeFigureOut">
               <a:rPr lang="en-US" smtClean="0"/>
               <a:pPr/>
-              <a:t>2/24/2013</a:t>
+              <a:t>2/26/2013</a:t>
             </a:fld>
             <a:endParaRPr lang="en-US"/>
           </a:p>
@@ -5117,7 +5118,7 @@
             <a:fld id="{1B7D6F30-1720-D44A-AAAC-31BBD1F6EF97}" type="datetimeFigureOut">
               <a:rPr lang="en-US" smtClean="0"/>
               <a:pPr/>
-              <a:t>2/24/2013</a:t>
+              <a:t>2/26/2013</a:t>
             </a:fld>
             <a:endParaRPr lang="en-US"/>
           </a:p>
@@ -6091,7 +6092,7 @@
         </p:spPr>
         <p:txBody>
           <a:bodyPr>
-            <a:normAutofit fontScale="85000" lnSpcReduction="10000"/>
+            <a:normAutofit fontScale="92500" lnSpcReduction="10000"/>
           </a:bodyPr>
           <a:lstStyle/>
           <a:p>
@@ -6193,26 +6194,6 @@
               <a:rPr lang="en-CA" dirty="0" err="1" smtClean="0"/>
               <a:t>consigne</a:t>
             </a:r>
-            <a:r>
-              <a:rPr lang="en-CA" dirty="0" smtClean="0"/>
-              <a:t> </a:t>
-            </a:r>
-            <a:r>
-              <a:rPr lang="en-CA" dirty="0" err="1" smtClean="0"/>
-              <a:t>selon</a:t>
-            </a:r>
-            <a:r>
-              <a:rPr lang="en-CA" dirty="0" smtClean="0"/>
-              <a:t> la </a:t>
-            </a:r>
-            <a:r>
-              <a:rPr lang="en-CA" dirty="0" smtClean="0"/>
-              <a:t>position pour limiter les </a:t>
-            </a:r>
-            <a:r>
-              <a:rPr lang="en-CA" dirty="0" err="1" smtClean="0"/>
-              <a:t>dépassements</a:t>
-            </a:r>
             <a:endParaRPr lang="en-CA" dirty="0" smtClean="0"/>
           </a:p>
           <a:p>
@@ -6223,7 +6204,15 @@
             </a:pPr>
             <a:r>
               <a:rPr lang="en-CA" dirty="0" err="1" smtClean="0"/>
-              <a:t>Fréquence</a:t>
+              <a:t>Choix</a:t>
+            </a:r>
+            <a:r>
+              <a:rPr lang="en-CA" dirty="0" smtClean="0"/>
+              <a:t> de </a:t>
+            </a:r>
+            <a:r>
+              <a:rPr lang="en-CA" dirty="0" err="1" smtClean="0"/>
+              <a:t>fréquence</a:t>
             </a:r>
             <a:r>
               <a:rPr lang="en-CA" dirty="0" smtClean="0"/>
@@ -6231,15 +6220,7 @@
             </a:r>
             <a:r>
               <a:rPr lang="en-CA" dirty="0" err="1" smtClean="0"/>
-              <a:t>adéquate</a:t>
-            </a:r>
-            <a:r>
-              <a:rPr lang="en-CA" dirty="0" smtClean="0"/>
-              <a:t> de </a:t>
-            </a:r>
-            <a:r>
-              <a:rPr lang="en-CA" dirty="0" err="1" smtClean="0"/>
-              <a:t>l’asservissement</a:t>
+              <a:t>d’asservissement</a:t>
             </a:r>
             <a:endParaRPr lang="en-CA" dirty="0" smtClean="0"/>
           </a:p>
@@ -6267,45 +6248,12 @@
             </a:pPr>
             <a:r>
               <a:rPr lang="en-CA" dirty="0" err="1" smtClean="0"/>
-              <a:t>Doit</a:t>
+              <a:t>Contraintes</a:t>
             </a:r>
             <a:r>
               <a:rPr lang="en-CA" dirty="0" smtClean="0"/>
-              <a:t> respecter </a:t>
-            </a:r>
-            <a:r>
-              <a:rPr lang="en-CA" dirty="0" err="1" smtClean="0"/>
-              <a:t>certaines</a:t>
-            </a:r>
-            <a:r>
-              <a:rPr lang="en-CA" dirty="0" smtClean="0"/>
-              <a:t> </a:t>
-            </a:r>
-            <a:r>
-              <a:rPr lang="en-CA" dirty="0" err="1" smtClean="0"/>
-              <a:t>c</a:t>
-            </a:r>
-            <a:r>
-              <a:rPr lang="en-CA" dirty="0" err="1" smtClean="0"/>
-              <a:t>ontraintes</a:t>
-            </a:r>
-            <a:r>
-              <a:rPr lang="en-CA" dirty="0" smtClean="0"/>
-              <a:t> de temps </a:t>
-            </a:r>
-            <a:r>
-              <a:rPr lang="en-CA" dirty="0" err="1" smtClean="0"/>
-              <a:t>d’exécution</a:t>
-            </a:r>
-            <a:r>
-              <a:rPr lang="en-CA" dirty="0" smtClean="0"/>
-              <a:t> et de </a:t>
-            </a:r>
-            <a:r>
-              <a:rPr lang="en-CA" dirty="0" err="1" smtClean="0"/>
-              <a:t>précision</a:t>
-            </a:r>
-            <a:endParaRPr lang="en-CA" dirty="0" smtClean="0"/>
+              <a:t> de temps</a:t>
+            </a:r>
           </a:p>
           <a:p>
             <a:pPr lvl="1">
@@ -6314,37 +6262,17 @@
               </a:lnSpc>
             </a:pPr>
             <a:r>
+              <a:rPr lang="en-CA" dirty="0" err="1" smtClean="0"/>
+              <a:t>Contraintes</a:t>
+            </a:r>
+            <a:r>
               <a:rPr lang="en-CA" dirty="0" smtClean="0"/>
-              <a:t>Limiter </a:t>
-            </a:r>
-            <a:r>
-              <a:rPr lang="en-CA" dirty="0" smtClean="0"/>
-              <a:t>les </a:t>
-            </a:r>
-            <a:r>
-              <a:rPr lang="en-CA" dirty="0" err="1" smtClean="0"/>
-              <a:t>changements</a:t>
-            </a:r>
-            <a:r>
-              <a:rPr lang="en-CA" dirty="0" smtClean="0"/>
-              <a:t> </a:t>
-            </a:r>
-            <a:r>
-              <a:rPr lang="en-CA" dirty="0" err="1" smtClean="0"/>
-              <a:t>brusques</a:t>
-            </a:r>
-            <a:r>
-              <a:rPr lang="en-CA" dirty="0" smtClean="0"/>
-              <a:t> de </a:t>
-            </a:r>
-            <a:r>
-              <a:rPr lang="en-CA" dirty="0" err="1" smtClean="0"/>
-              <a:t>commandes</a:t>
+              <a:t> de position</a:t>
             </a:r>
             <a:endParaRPr lang="en-CA" dirty="0" smtClean="0"/>
           </a:p>
           <a:p>
-            <a:pPr lvl="2">
+            <a:pPr lvl="1">
               <a:lnSpc>
                 <a:spcPct val="160000"/>
               </a:lnSpc>
@@ -6393,12 +6321,10 @@
   </p:clrMapOvr>
   <mc:AlternateContent xmlns:mc="http://schemas.openxmlformats.org/markup-compatibility/2006" xmlns:p14="http://schemas.microsoft.com/office/powerpoint/2010/main">
     <mc:Choice Requires="p14">
-      <p:transition p14:dur="0"/>
+      <p:transition p14:dur="10"/>
     </mc:Choice>
     <mc:Fallback xmlns="">
-      <p:transition spd="slow">
-        <p:fade/>
-      </p:transition>
+      <p:transition/>
     </mc:Fallback>
   </mc:AlternateContent>
   <p:timing>

</xml_diff>